<commit_message>
Code Review Prep 1
Before fixing the SimpleECL Definition
</commit_message>
<xml_diff>
--- a/hsqlt/notes/HSQL Translation.pptx
+++ b/hsqlt/notes/HSQL Translation.pptx
@@ -105,6 +105,11 @@
       </a:defRPr>
     </a:lvl9pPr>
   </p:defaultTextStyle>
+  <p:extLst>
+    <p:ext uri="{EFAFB233-063F-42B5-8137-9DF3F51BA10A}">
+      <p15:sldGuideLst xmlns:p15="http://schemas.microsoft.com/office/powerpoint/2012/main"/>
+    </p:ext>
+  </p:extLst>
 </p:presentation>
 </file>
 
@@ -255,7 +260,7 @@
           <a:p>
             <a:fld id="{D098BF69-FD7F-462F-9B37-70AB0ECAC3F1}" type="datetimeFigureOut">
               <a:rPr lang="en-US" smtClean="0"/>
-              <a:t>7/15/2021</a:t>
+              <a:t>7/19/2021</a:t>
             </a:fld>
             <a:endParaRPr lang="en-US"/>
           </a:p>
@@ -453,7 +458,7 @@
           <a:p>
             <a:fld id="{D098BF69-FD7F-462F-9B37-70AB0ECAC3F1}" type="datetimeFigureOut">
               <a:rPr lang="en-US" smtClean="0"/>
-              <a:t>7/15/2021</a:t>
+              <a:t>7/19/2021</a:t>
             </a:fld>
             <a:endParaRPr lang="en-US"/>
           </a:p>
@@ -661,7 +666,7 @@
           <a:p>
             <a:fld id="{D098BF69-FD7F-462F-9B37-70AB0ECAC3F1}" type="datetimeFigureOut">
               <a:rPr lang="en-US" smtClean="0"/>
-              <a:t>7/15/2021</a:t>
+              <a:t>7/19/2021</a:t>
             </a:fld>
             <a:endParaRPr lang="en-US"/>
           </a:p>
@@ -859,7 +864,7 @@
           <a:p>
             <a:fld id="{D098BF69-FD7F-462F-9B37-70AB0ECAC3F1}" type="datetimeFigureOut">
               <a:rPr lang="en-US" smtClean="0"/>
-              <a:t>7/15/2021</a:t>
+              <a:t>7/19/2021</a:t>
             </a:fld>
             <a:endParaRPr lang="en-US"/>
           </a:p>
@@ -1134,7 +1139,7 @@
           <a:p>
             <a:fld id="{D098BF69-FD7F-462F-9B37-70AB0ECAC3F1}" type="datetimeFigureOut">
               <a:rPr lang="en-US" smtClean="0"/>
-              <a:t>7/15/2021</a:t>
+              <a:t>7/19/2021</a:t>
             </a:fld>
             <a:endParaRPr lang="en-US"/>
           </a:p>
@@ -1399,7 +1404,7 @@
           <a:p>
             <a:fld id="{D098BF69-FD7F-462F-9B37-70AB0ECAC3F1}" type="datetimeFigureOut">
               <a:rPr lang="en-US" smtClean="0"/>
-              <a:t>7/15/2021</a:t>
+              <a:t>7/19/2021</a:t>
             </a:fld>
             <a:endParaRPr lang="en-US"/>
           </a:p>
@@ -1811,7 +1816,7 @@
           <a:p>
             <a:fld id="{D098BF69-FD7F-462F-9B37-70AB0ECAC3F1}" type="datetimeFigureOut">
               <a:rPr lang="en-US" smtClean="0"/>
-              <a:t>7/15/2021</a:t>
+              <a:t>7/19/2021</a:t>
             </a:fld>
             <a:endParaRPr lang="en-US"/>
           </a:p>
@@ -1952,7 +1957,7 @@
           <a:p>
             <a:fld id="{D098BF69-FD7F-462F-9B37-70AB0ECAC3F1}" type="datetimeFigureOut">
               <a:rPr lang="en-US" smtClean="0"/>
-              <a:t>7/15/2021</a:t>
+              <a:t>7/19/2021</a:t>
             </a:fld>
             <a:endParaRPr lang="en-US"/>
           </a:p>
@@ -2065,7 +2070,7 @@
           <a:p>
             <a:fld id="{D098BF69-FD7F-462F-9B37-70AB0ECAC3F1}" type="datetimeFigureOut">
               <a:rPr lang="en-US" smtClean="0"/>
-              <a:t>7/15/2021</a:t>
+              <a:t>7/19/2021</a:t>
             </a:fld>
             <a:endParaRPr lang="en-US"/>
           </a:p>
@@ -2376,7 +2381,7 @@
           <a:p>
             <a:fld id="{D098BF69-FD7F-462F-9B37-70AB0ECAC3F1}" type="datetimeFigureOut">
               <a:rPr lang="en-US" smtClean="0"/>
-              <a:t>7/15/2021</a:t>
+              <a:t>7/19/2021</a:t>
             </a:fld>
             <a:endParaRPr lang="en-US"/>
           </a:p>
@@ -2664,7 +2669,7 @@
           <a:p>
             <a:fld id="{D098BF69-FD7F-462F-9B37-70AB0ECAC3F1}" type="datetimeFigureOut">
               <a:rPr lang="en-US" smtClean="0"/>
-              <a:t>7/15/2021</a:t>
+              <a:t>7/19/2021</a:t>
             </a:fld>
             <a:endParaRPr lang="en-US"/>
           </a:p>
@@ -2905,7 +2910,7 @@
           <a:p>
             <a:fld id="{D098BF69-FD7F-462F-9B37-70AB0ECAC3F1}" type="datetimeFigureOut">
               <a:rPr lang="en-US" smtClean="0"/>
-              <a:t>7/15/2021</a:t>
+              <a:t>7/19/2021</a:t>
             </a:fld>
             <a:endParaRPr lang="en-US"/>
           </a:p>
@@ -3426,7 +3431,10 @@
           <a:bodyPr/>
           <a:lstStyle/>
           <a:p>
-            <a:endParaRPr lang="en-US"/>
+            <a:r>
+              <a:rPr lang="en-US" dirty="0"/>
+              <a:t>What is HSQL?</a:t>
+            </a:r>
           </a:p>
         </p:txBody>
       </p:sp>
@@ -3451,7 +3459,7 @@
           <a:bodyPr/>
           <a:lstStyle/>
           <a:p>
-            <a:endParaRPr lang="en-US"/>
+            <a:endParaRPr lang="en-US" dirty="0"/>
           </a:p>
         </p:txBody>
       </p:sp>

</xml_diff>